<commit_message>
finished word + powerpoint files - ready to sent
</commit_message>
<xml_diff>
--- a/Diagram.pptx
+++ b/Diagram.pptx
@@ -104,6 +104,11 @@
       </a:defRPr>
     </a:lvl9pPr>
   </p:defaultTextStyle>
+  <p:extLst>
+    <p:ext uri="{EFAFB233-063F-42B5-8137-9DF3F51BA10A}">
+      <p15:sldGuideLst xmlns:p15="http://schemas.microsoft.com/office/powerpoint/2012/main"/>
+    </p:ext>
+  </p:extLst>
 </p:presentation>
 </file>
 
@@ -2964,207 +2969,21 @@
           <a:chExt cx="0" cy="0"/>
         </a:xfrm>
       </p:grpSpPr>
-      <p:sp>
-        <p:nvSpPr>
-          <p:cNvPr id="4" name="Rectangle 3"/>
-          <p:cNvSpPr/>
-          <p:nvPr/>
-        </p:nvSpPr>
-        <p:spPr>
-          <a:xfrm>
-            <a:off x="5146765" y="52251"/>
-            <a:ext cx="1698172" cy="2499360"/>
-          </a:xfrm>
-          <a:prstGeom prst="rect">
-            <a:avLst/>
-          </a:prstGeom>
-          <a:noFill/>
-          <a:ln>
-            <a:solidFill>
-              <a:schemeClr val="tx1"/>
-            </a:solidFill>
-          </a:ln>
-        </p:spPr>
-        <p:style>
-          <a:lnRef idx="2">
-            <a:schemeClr val="accent1">
-              <a:shade val="50000"/>
-            </a:schemeClr>
-          </a:lnRef>
-          <a:fillRef idx="1">
-            <a:schemeClr val="accent1"/>
-          </a:fillRef>
-          <a:effectRef idx="0">
-            <a:schemeClr val="accent1"/>
-          </a:effectRef>
-          <a:fontRef idx="minor">
-            <a:schemeClr val="lt1"/>
-          </a:fontRef>
-        </p:style>
-        <p:txBody>
-          <a:bodyPr rtlCol="1" anchor="ctr"/>
-          <a:lstStyle/>
-          <a:p>
-            <a:pPr algn="ctr"/>
-            <a:endParaRPr lang="he-IL"/>
-          </a:p>
-        </p:txBody>
-      </p:sp>
-      <p:sp>
-        <p:nvSpPr>
-          <p:cNvPr id="5" name="Rectangle 4"/>
-          <p:cNvSpPr/>
-          <p:nvPr/>
-        </p:nvSpPr>
-        <p:spPr>
-          <a:xfrm>
-            <a:off x="4606834" y="3561806"/>
-            <a:ext cx="2734491" cy="2368732"/>
-          </a:xfrm>
-          <a:prstGeom prst="rect">
-            <a:avLst/>
-          </a:prstGeom>
-          <a:noFill/>
-          <a:ln>
-            <a:solidFill>
-              <a:schemeClr val="tx1"/>
-            </a:solidFill>
-          </a:ln>
-        </p:spPr>
-        <p:style>
-          <a:lnRef idx="2">
-            <a:schemeClr val="accent1">
-              <a:shade val="50000"/>
-            </a:schemeClr>
-          </a:lnRef>
-          <a:fillRef idx="1">
-            <a:schemeClr val="accent1"/>
-          </a:fillRef>
-          <a:effectRef idx="0">
-            <a:schemeClr val="accent1"/>
-          </a:effectRef>
-          <a:fontRef idx="minor">
-            <a:schemeClr val="lt1"/>
-          </a:fontRef>
-        </p:style>
-        <p:txBody>
-          <a:bodyPr rtlCol="1" anchor="ctr"/>
-          <a:lstStyle/>
-          <a:p>
-            <a:pPr algn="ctr"/>
-            <a:endParaRPr lang="he-IL"/>
-          </a:p>
-        </p:txBody>
-      </p:sp>
-      <p:sp>
-        <p:nvSpPr>
-          <p:cNvPr id="6" name="Rectangle 5"/>
-          <p:cNvSpPr/>
-          <p:nvPr/>
-        </p:nvSpPr>
-        <p:spPr>
-          <a:xfrm>
-            <a:off x="661852" y="3561806"/>
-            <a:ext cx="2734491" cy="2368732"/>
-          </a:xfrm>
-          <a:prstGeom prst="rect">
-            <a:avLst/>
-          </a:prstGeom>
-          <a:noFill/>
-          <a:ln>
-            <a:solidFill>
-              <a:schemeClr val="tx1"/>
-            </a:solidFill>
-          </a:ln>
-        </p:spPr>
-        <p:style>
-          <a:lnRef idx="2">
-            <a:schemeClr val="accent1">
-              <a:shade val="50000"/>
-            </a:schemeClr>
-          </a:lnRef>
-          <a:fillRef idx="1">
-            <a:schemeClr val="accent1"/>
-          </a:fillRef>
-          <a:effectRef idx="0">
-            <a:schemeClr val="accent1"/>
-          </a:effectRef>
-          <a:fontRef idx="minor">
-            <a:schemeClr val="lt1"/>
-          </a:fontRef>
-        </p:style>
-        <p:txBody>
-          <a:bodyPr rtlCol="1" anchor="ctr"/>
-          <a:lstStyle/>
-          <a:p>
-            <a:pPr algn="ctr"/>
-            <a:endParaRPr lang="he-IL"/>
-          </a:p>
-        </p:txBody>
-      </p:sp>
-      <p:sp>
-        <p:nvSpPr>
-          <p:cNvPr id="7" name="Rectangle 6"/>
-          <p:cNvSpPr/>
-          <p:nvPr/>
-        </p:nvSpPr>
-        <p:spPr>
-          <a:xfrm>
-            <a:off x="8551816" y="3561806"/>
-            <a:ext cx="2734491" cy="2368732"/>
-          </a:xfrm>
-          <a:prstGeom prst="rect">
-            <a:avLst/>
-          </a:prstGeom>
-          <a:noFill/>
-          <a:ln>
-            <a:solidFill>
-              <a:schemeClr val="tx1"/>
-            </a:solidFill>
-          </a:ln>
-        </p:spPr>
-        <p:style>
-          <a:lnRef idx="2">
-            <a:schemeClr val="accent1">
-              <a:shade val="50000"/>
-            </a:schemeClr>
-          </a:lnRef>
-          <a:fillRef idx="1">
-            <a:schemeClr val="accent1"/>
-          </a:fillRef>
-          <a:effectRef idx="0">
-            <a:schemeClr val="accent1"/>
-          </a:effectRef>
-          <a:fontRef idx="minor">
-            <a:schemeClr val="lt1"/>
-          </a:fontRef>
-        </p:style>
-        <p:txBody>
-          <a:bodyPr rtlCol="1" anchor="ctr"/>
-          <a:lstStyle/>
-          <a:p>
-            <a:pPr algn="ctr"/>
-            <a:endParaRPr lang="he-IL"/>
-          </a:p>
-        </p:txBody>
-      </p:sp>
       <p:cxnSp>
         <p:nvCxnSpPr>
-          <p:cNvPr id="11" name="Straight Connector 10"/>
-          <p:cNvCxnSpPr>
-            <a:stCxn id="6" idx="0"/>
-          </p:cNvCxnSpPr>
+          <p:cNvPr id="16" name="Straight Connector 15"/>
+          <p:cNvCxnSpPr/>
           <p:nvPr/>
         </p:nvCxnSpPr>
         <p:spPr>
           <a:xfrm flipH="1" flipV="1">
-            <a:off x="2029097" y="2969623"/>
-            <a:ext cx="1" cy="592183"/>
+            <a:off x="2029098" y="3390731"/>
+            <a:ext cx="7460183" cy="2"/>
           </a:xfrm>
           <a:prstGeom prst="line">
             <a:avLst/>
           </a:prstGeom>
-          <a:ln>
+          <a:ln w="34925">
             <a:solidFill>
               <a:schemeClr val="tx1"/>
             </a:solidFill>
@@ -3185,113 +3004,6 @@
           </a:fontRef>
         </p:style>
       </p:cxnSp>
-      <p:cxnSp>
-        <p:nvCxnSpPr>
-          <p:cNvPr id="13" name="Straight Connector 12"/>
-          <p:cNvCxnSpPr>
-            <a:endCxn id="19" idx="3"/>
-          </p:cNvCxnSpPr>
-          <p:nvPr/>
-        </p:nvCxnSpPr>
-        <p:spPr>
-          <a:xfrm flipH="1" flipV="1">
-            <a:off x="5947952" y="2795450"/>
-            <a:ext cx="2" cy="818607"/>
-          </a:xfrm>
-          <a:prstGeom prst="line">
-            <a:avLst/>
-          </a:prstGeom>
-          <a:ln>
-            <a:solidFill>
-              <a:schemeClr val="tx1"/>
-            </a:solidFill>
-          </a:ln>
-        </p:spPr>
-        <p:style>
-          <a:lnRef idx="1">
-            <a:schemeClr val="accent1"/>
-          </a:lnRef>
-          <a:fillRef idx="0">
-            <a:schemeClr val="accent1"/>
-          </a:fillRef>
-          <a:effectRef idx="0">
-            <a:schemeClr val="accent1"/>
-          </a:effectRef>
-          <a:fontRef idx="minor">
-            <a:schemeClr val="tx1"/>
-          </a:fontRef>
-        </p:style>
-      </p:cxnSp>
-      <p:cxnSp>
-        <p:nvCxnSpPr>
-          <p:cNvPr id="14" name="Straight Connector 13"/>
-          <p:cNvCxnSpPr/>
-          <p:nvPr/>
-        </p:nvCxnSpPr>
-        <p:spPr>
-          <a:xfrm flipH="1" flipV="1">
-            <a:off x="9919060" y="2969622"/>
-            <a:ext cx="1" cy="592183"/>
-          </a:xfrm>
-          <a:prstGeom prst="line">
-            <a:avLst/>
-          </a:prstGeom>
-          <a:ln>
-            <a:solidFill>
-              <a:schemeClr val="tx1"/>
-            </a:solidFill>
-          </a:ln>
-        </p:spPr>
-        <p:style>
-          <a:lnRef idx="1">
-            <a:schemeClr val="accent1"/>
-          </a:lnRef>
-          <a:fillRef idx="0">
-            <a:schemeClr val="accent1"/>
-          </a:fillRef>
-          <a:effectRef idx="0">
-            <a:schemeClr val="accent1"/>
-          </a:effectRef>
-          <a:fontRef idx="minor">
-            <a:schemeClr val="tx1"/>
-          </a:fontRef>
-        </p:style>
-      </p:cxnSp>
-      <p:cxnSp>
-        <p:nvCxnSpPr>
-          <p:cNvPr id="16" name="Straight Connector 15"/>
-          <p:cNvCxnSpPr/>
-          <p:nvPr/>
-        </p:nvCxnSpPr>
-        <p:spPr>
-          <a:xfrm flipH="1">
-            <a:off x="2029097" y="2969622"/>
-            <a:ext cx="7889963" cy="1"/>
-          </a:xfrm>
-          <a:prstGeom prst="line">
-            <a:avLst/>
-          </a:prstGeom>
-          <a:ln>
-            <a:solidFill>
-              <a:schemeClr val="tx1"/>
-            </a:solidFill>
-          </a:ln>
-        </p:spPr>
-        <p:style>
-          <a:lnRef idx="1">
-            <a:schemeClr val="accent1"/>
-          </a:lnRef>
-          <a:fillRef idx="0">
-            <a:schemeClr val="accent1"/>
-          </a:fillRef>
-          <a:effectRef idx="0">
-            <a:schemeClr val="accent1"/>
-          </a:effectRef>
-          <a:fontRef idx="minor">
-            <a:schemeClr val="tx1"/>
-          </a:fontRef>
-        </p:style>
-      </p:cxnSp>
       <p:sp>
         <p:nvSpPr>
           <p:cNvPr id="19" name="Isosceles Triangle 18"/>
@@ -3300,7 +3012,7 @@
         </p:nvSpPr>
         <p:spPr>
           <a:xfrm>
-            <a:off x="5860865" y="2551611"/>
+            <a:off x="5860865" y="2972719"/>
             <a:ext cx="174173" cy="243839"/>
           </a:xfrm>
           <a:prstGeom prst="triangle">
@@ -3338,416 +3050,203 @@
           </a:p>
         </p:txBody>
       </p:sp>
-      <p:graphicFrame>
-        <p:nvGraphicFramePr>
-          <p:cNvPr id="21" name="Table 20"/>
-          <p:cNvGraphicFramePr>
-            <a:graphicFrameLocks noGrp="1"/>
-          </p:cNvGraphicFramePr>
-          <p:nvPr>
-            <p:extLst>
-              <p:ext uri="{D42A27DB-BD31-4B8C-83A1-F6EECF244321}">
-                <p14:modId xmlns:p14="http://schemas.microsoft.com/office/powerpoint/2010/main" val="3179480631"/>
-              </p:ext>
-            </p:extLst>
-          </p:nvPr>
-        </p:nvGraphicFramePr>
-        <p:xfrm>
-          <a:off x="5193211" y="177320"/>
-          <a:ext cx="1625600" cy="2339458"/>
-        </p:xfrm>
-        <a:graphic>
-          <a:graphicData uri="http://schemas.openxmlformats.org/drawingml/2006/table">
-            <a:tbl>
-              <a:tblPr>
-                <a:tableStyleId>{5C22544A-7EE6-4342-B048-85BDC9FD1C3A}</a:tableStyleId>
-              </a:tblPr>
-              <a:tblGrid>
-                <a:gridCol w="1625600"/>
-              </a:tblGrid>
-              <a:tr h="179843">
-                <a:tc>
-                  <a:txBody>
-                    <a:bodyPr/>
-                    <a:lstStyle/>
-                    <a:p>
-                      <a:pPr algn="ctr" fontAlgn="b"/>
-                      <a:r>
-                        <a:rPr lang="en-US" sz="1100" u="none" strike="noStrike" dirty="0">
-                          <a:effectLst/>
-                        </a:rPr>
-                        <a:t>Vehicle</a:t>
-                      </a:r>
-                      <a:endParaRPr lang="en-US" sz="1100" b="0" i="0" u="none" strike="noStrike" dirty="0">
-                        <a:solidFill>
-                          <a:srgbClr val="000000"/>
-                        </a:solidFill>
-                        <a:effectLst/>
-                        <a:latin typeface="Arial" panose="020B0604020202020204" pitchFamily="34" charset="0"/>
-                      </a:endParaRPr>
-                    </a:p>
-                  </a:txBody>
-                  <a:tcPr marL="9525" marR="9525" marT="9525" marB="0" anchor="b"/>
-                </a:tc>
-              </a:tr>
-              <a:tr h="179843">
-                <a:tc>
-                  <a:txBody>
-                    <a:bodyPr/>
-                    <a:lstStyle/>
-                    <a:p>
-                      <a:pPr algn="l" fontAlgn="b"/>
-                      <a:r>
-                        <a:rPr lang="en-US" sz="1100" u="none" strike="noStrike">
-                          <a:effectLst/>
-                        </a:rPr>
-                        <a:t>- m_Model</a:t>
-                      </a:r>
-                      <a:endParaRPr lang="en-US" sz="1100" b="0" i="0" u="none" strike="noStrike">
-                        <a:solidFill>
-                          <a:srgbClr val="000000"/>
-                        </a:solidFill>
-                        <a:effectLst/>
-                        <a:latin typeface="Arial" panose="020B0604020202020204" pitchFamily="34" charset="0"/>
-                      </a:endParaRPr>
-                    </a:p>
-                  </a:txBody>
-                  <a:tcPr marL="9525" marR="9525" marT="9525" marB="0" anchor="b"/>
-                </a:tc>
-              </a:tr>
-              <a:tr h="179843">
-                <a:tc>
-                  <a:txBody>
-                    <a:bodyPr/>
-                    <a:lstStyle/>
-                    <a:p>
-                      <a:pPr algn="l" fontAlgn="b"/>
-                      <a:r>
-                        <a:rPr lang="en-US" sz="1100" u="none" strike="noStrike">
-                          <a:effectLst/>
-                        </a:rPr>
-                        <a:t>- m_LPN</a:t>
-                      </a:r>
-                      <a:endParaRPr lang="en-US" sz="1100" b="0" i="0" u="none" strike="noStrike">
-                        <a:solidFill>
-                          <a:srgbClr val="000000"/>
-                        </a:solidFill>
-                        <a:effectLst/>
-                        <a:latin typeface="Arial" panose="020B0604020202020204" pitchFamily="34" charset="0"/>
-                      </a:endParaRPr>
-                    </a:p>
-                  </a:txBody>
-                  <a:tcPr marL="9525" marR="9525" marT="9525" marB="0" anchor="b"/>
-                </a:tc>
-              </a:tr>
-              <a:tr h="179843">
-                <a:tc>
-                  <a:txBody>
-                    <a:bodyPr/>
-                    <a:lstStyle/>
-                    <a:p>
-                      <a:pPr algn="l" fontAlgn="b"/>
-                      <a:r>
-                        <a:rPr lang="en-US" sz="1100" u="none" strike="noStrike">
-                          <a:effectLst/>
-                        </a:rPr>
-                        <a:t>- m_Wheels</a:t>
-                      </a:r>
-                      <a:endParaRPr lang="en-US" sz="1100" b="0" i="0" u="none" strike="noStrike">
-                        <a:solidFill>
-                          <a:srgbClr val="000000"/>
-                        </a:solidFill>
-                        <a:effectLst/>
-                        <a:latin typeface="Arial" panose="020B0604020202020204" pitchFamily="34" charset="0"/>
-                      </a:endParaRPr>
-                    </a:p>
-                  </a:txBody>
-                  <a:tcPr marL="9525" marR="9525" marT="9525" marB="0" anchor="b"/>
-                </a:tc>
-              </a:tr>
-              <a:tr h="179843">
-                <a:tc>
-                  <a:txBody>
-                    <a:bodyPr/>
-                    <a:lstStyle/>
-                    <a:p>
-                      <a:pPr algn="l" fontAlgn="b"/>
-                      <a:r>
-                        <a:rPr lang="en-US" sz="1100" u="none" strike="noStrike" dirty="0">
-                          <a:effectLst/>
-                        </a:rPr>
-                        <a:t>- m_OwnerName</a:t>
-                      </a:r>
-                      <a:endParaRPr lang="en-US" sz="1100" b="0" i="0" u="none" strike="noStrike" dirty="0">
-                        <a:solidFill>
-                          <a:srgbClr val="000000"/>
-                        </a:solidFill>
-                        <a:effectLst/>
-                        <a:latin typeface="Arial" panose="020B0604020202020204" pitchFamily="34" charset="0"/>
-                      </a:endParaRPr>
-                    </a:p>
-                  </a:txBody>
-                  <a:tcPr marL="9525" marR="9525" marT="9525" marB="0" anchor="b"/>
-                </a:tc>
-              </a:tr>
-              <a:tr h="179843">
-                <a:tc>
-                  <a:txBody>
-                    <a:bodyPr/>
-                    <a:lstStyle/>
-                    <a:p>
-                      <a:pPr algn="l" fontAlgn="b"/>
-                      <a:r>
-                        <a:rPr lang="en-US" sz="1100" u="none" strike="noStrike">
-                          <a:effectLst/>
-                        </a:rPr>
-                        <a:t>- m_OwnerPhoneNumber</a:t>
-                      </a:r>
-                      <a:endParaRPr lang="en-US" sz="1100" b="0" i="0" u="none" strike="noStrike">
-                        <a:solidFill>
-                          <a:srgbClr val="000000"/>
-                        </a:solidFill>
-                        <a:effectLst/>
-                        <a:latin typeface="Arial" panose="020B0604020202020204" pitchFamily="34" charset="0"/>
-                      </a:endParaRPr>
-                    </a:p>
-                  </a:txBody>
-                  <a:tcPr marL="9525" marR="9525" marT="9525" marB="0" anchor="b"/>
-                </a:tc>
-              </a:tr>
-              <a:tr h="179843">
-                <a:tc>
-                  <a:txBody>
-                    <a:bodyPr/>
-                    <a:lstStyle/>
-                    <a:p>
-                      <a:pPr algn="l" fontAlgn="b"/>
-                      <a:r>
-                        <a:rPr lang="en-US" sz="1100" u="none" strike="noStrike">
-                          <a:effectLst/>
-                        </a:rPr>
-                        <a:t>- m_Energy</a:t>
-                      </a:r>
-                      <a:endParaRPr lang="en-US" sz="1100" b="0" i="0" u="none" strike="noStrike">
-                        <a:solidFill>
-                          <a:srgbClr val="000000"/>
-                        </a:solidFill>
-                        <a:effectLst/>
-                        <a:latin typeface="Arial" panose="020B0604020202020204" pitchFamily="34" charset="0"/>
-                      </a:endParaRPr>
-                    </a:p>
-                  </a:txBody>
-                  <a:tcPr marL="9525" marR="9525" marT="9525" marB="0" anchor="b"/>
-                </a:tc>
-              </a:tr>
-              <a:tr h="181342">
-                <a:tc>
-                  <a:txBody>
-                    <a:bodyPr/>
-                    <a:lstStyle/>
-                    <a:p>
-                      <a:pPr algn="l" fontAlgn="b"/>
-                      <a:r>
-                        <a:rPr lang="en-US" sz="1100" u="none" strike="noStrike" dirty="0" smtClean="0">
-                          <a:effectLst/>
-                        </a:rPr>
-                        <a:t>- m_VehicleState</a:t>
-                      </a:r>
-                      <a:endParaRPr lang="en-US" sz="1100" b="0" i="0" u="none" strike="noStrike" dirty="0">
-                        <a:solidFill>
-                          <a:srgbClr val="000000"/>
-                        </a:solidFill>
-                        <a:effectLst/>
-                        <a:latin typeface="Arial" panose="020B0604020202020204" pitchFamily="34" charset="0"/>
-                      </a:endParaRPr>
-                    </a:p>
-                  </a:txBody>
-                  <a:tcPr marL="9525" marR="9525" marT="9525" marB="0" anchor="b"/>
-                </a:tc>
-              </a:tr>
-              <a:tr h="179843">
-                <a:tc>
-                  <a:txBody>
-                    <a:bodyPr/>
-                    <a:lstStyle/>
-                    <a:p>
-                      <a:pPr algn="l" fontAlgn="b"/>
-                      <a:r>
-                        <a:rPr lang="en-US" sz="1100" u="none" strike="noStrike" dirty="0">
-                          <a:effectLst/>
-                        </a:rPr>
-                        <a:t>+ ToString()</a:t>
-                      </a:r>
-                      <a:endParaRPr lang="en-US" sz="1100" b="0" i="0" u="none" strike="noStrike" dirty="0">
-                        <a:solidFill>
-                          <a:srgbClr val="000000"/>
-                        </a:solidFill>
-                        <a:effectLst/>
-                        <a:latin typeface="Arial" panose="020B0604020202020204" pitchFamily="34" charset="0"/>
-                      </a:endParaRPr>
-                    </a:p>
-                  </a:txBody>
-                  <a:tcPr marL="9525" marR="9525" marT="9525" marB="0" anchor="b"/>
-                </a:tc>
-              </a:tr>
-              <a:tr h="179843">
-                <a:tc>
-                  <a:txBody>
-                    <a:bodyPr/>
-                    <a:lstStyle/>
-                    <a:p>
-                      <a:pPr algn="l" fontAlgn="b"/>
-                      <a:r>
-                        <a:rPr lang="en-US" sz="1100" u="none" strike="noStrike" dirty="0">
-                          <a:effectLst/>
-                        </a:rPr>
-                        <a:t>+ Vehicle()</a:t>
-                      </a:r>
-                      <a:endParaRPr lang="en-US" sz="1100" b="0" i="0" u="none" strike="noStrike" dirty="0">
-                        <a:solidFill>
-                          <a:srgbClr val="000000"/>
-                        </a:solidFill>
-                        <a:effectLst/>
-                        <a:latin typeface="Arial" panose="020B0604020202020204" pitchFamily="34" charset="0"/>
-                      </a:endParaRPr>
-                    </a:p>
-                  </a:txBody>
-                  <a:tcPr marL="9525" marR="9525" marT="9525" marB="0" anchor="b"/>
-                </a:tc>
-              </a:tr>
-              <a:tr h="179843">
-                <a:tc>
-                  <a:txBody>
-                    <a:bodyPr/>
-                    <a:lstStyle/>
-                    <a:p>
-                      <a:pPr algn="l" fontAlgn="b"/>
-                      <a:r>
-                        <a:rPr lang="en-US" sz="1100" u="none" strike="noStrike" dirty="0">
-                          <a:effectLst/>
-                        </a:rPr>
-                        <a:t>+ FillEnergy()</a:t>
-                      </a:r>
-                      <a:endParaRPr lang="en-US" sz="1100" b="0" i="0" u="none" strike="noStrike" dirty="0">
-                        <a:solidFill>
-                          <a:srgbClr val="000000"/>
-                        </a:solidFill>
-                        <a:effectLst/>
-                        <a:latin typeface="Arial" panose="020B0604020202020204" pitchFamily="34" charset="0"/>
-                      </a:endParaRPr>
-                    </a:p>
-                  </a:txBody>
-                  <a:tcPr marL="9525" marR="9525" marT="9525" marB="0" anchor="b"/>
-                </a:tc>
-              </a:tr>
-              <a:tr h="179843">
-                <a:tc>
-                  <a:txBody>
-                    <a:bodyPr/>
-                    <a:lstStyle/>
-                    <a:p>
-                      <a:pPr algn="l" fontAlgn="b"/>
-                      <a:r>
-                        <a:rPr lang="en-US" sz="1100" u="none" strike="noStrike" dirty="0">
-                          <a:effectLst/>
-                        </a:rPr>
-                        <a:t>+ FillAirToMaxPressure()</a:t>
-                      </a:r>
-                      <a:endParaRPr lang="en-US" sz="1100" b="0" i="0" u="none" strike="noStrike" dirty="0">
-                        <a:solidFill>
-                          <a:srgbClr val="000000"/>
-                        </a:solidFill>
-                        <a:effectLst/>
-                        <a:latin typeface="Arial" panose="020B0604020202020204" pitchFamily="34" charset="0"/>
-                      </a:endParaRPr>
-                    </a:p>
-                  </a:txBody>
-                  <a:tcPr marL="9525" marR="9525" marT="9525" marB="0" anchor="b"/>
-                </a:tc>
-              </a:tr>
-              <a:tr h="179843">
-                <a:tc>
-                  <a:txBody>
-                    <a:bodyPr/>
-                    <a:lstStyle/>
-                    <a:p>
-                      <a:pPr algn="l" fontAlgn="b"/>
-                      <a:r>
-                        <a:rPr lang="en-US" sz="1100" u="none" strike="noStrike" dirty="0">
-                          <a:effectLst/>
-                        </a:rPr>
-                        <a:t>+ GetGeneralDetails()</a:t>
-                      </a:r>
-                      <a:endParaRPr lang="en-US" sz="1100" b="0" i="0" u="none" strike="noStrike" dirty="0">
-                        <a:solidFill>
-                          <a:srgbClr val="000000"/>
-                        </a:solidFill>
-                        <a:effectLst/>
-                        <a:latin typeface="Arial" panose="020B0604020202020204" pitchFamily="34" charset="0"/>
-                      </a:endParaRPr>
-                    </a:p>
-                  </a:txBody>
-                  <a:tcPr marL="9525" marR="9525" marT="9525" marB="0" anchor="b"/>
-                </a:tc>
-              </a:tr>
-            </a:tbl>
-          </a:graphicData>
-        </a:graphic>
-      </p:graphicFrame>
+      <p:pic>
+        <p:nvPicPr>
+          <p:cNvPr id="2" name="Picture 1"/>
+          <p:cNvPicPr>
+            <a:picLocks noChangeAspect="1"/>
+          </p:cNvPicPr>
+          <p:nvPr/>
+        </p:nvPicPr>
+        <p:blipFill>
+          <a:blip r:embed="rId2"/>
+          <a:stretch>
+            <a:fillRect/>
+          </a:stretch>
+        </p:blipFill>
+        <p:spPr>
+          <a:xfrm>
+            <a:off x="714105" y="3982913"/>
+            <a:ext cx="2682238" cy="2193783"/>
+          </a:xfrm>
+          <a:prstGeom prst="rect">
+            <a:avLst/>
+          </a:prstGeom>
+        </p:spPr>
+      </p:pic>
       <p:cxnSp>
         <p:nvCxnSpPr>
-          <p:cNvPr id="24" name="Straight Connector 23"/>
+          <p:cNvPr id="11" name="Straight Connector 10"/>
           <p:cNvCxnSpPr/>
           <p:nvPr/>
         </p:nvCxnSpPr>
         <p:spPr>
-          <a:xfrm>
-            <a:off x="5146765" y="1619793"/>
-            <a:ext cx="1698172" cy="0"/>
+          <a:xfrm flipV="1">
+            <a:off x="2029096" y="3390733"/>
+            <a:ext cx="2" cy="709406"/>
           </a:xfrm>
           <a:prstGeom prst="line">
             <a:avLst/>
           </a:prstGeom>
+          <a:ln w="34925">
+            <a:solidFill>
+              <a:schemeClr val="tx1"/>
+            </a:solidFill>
+          </a:ln>
         </p:spPr>
         <p:style>
           <a:lnRef idx="1">
-            <a:schemeClr val="dk1"/>
+            <a:schemeClr val="accent1"/>
           </a:lnRef>
           <a:fillRef idx="0">
-            <a:schemeClr val="dk1"/>
+            <a:schemeClr val="accent1"/>
           </a:fillRef>
           <a:effectRef idx="0">
-            <a:schemeClr val="dk1"/>
+            <a:schemeClr val="accent1"/>
           </a:effectRef>
           <a:fontRef idx="minor">
             <a:schemeClr val="tx1"/>
           </a:fontRef>
         </p:style>
       </p:cxnSp>
+      <p:pic>
+        <p:nvPicPr>
+          <p:cNvPr id="10" name="Picture 9"/>
+          <p:cNvPicPr>
+            <a:picLocks noChangeAspect="1"/>
+          </p:cNvPicPr>
+          <p:nvPr/>
+        </p:nvPicPr>
+        <p:blipFill>
+          <a:blip r:embed="rId3"/>
+          <a:stretch>
+            <a:fillRect/>
+          </a:stretch>
+        </p:blipFill>
+        <p:spPr>
+          <a:xfrm>
+            <a:off x="4720046" y="3982913"/>
+            <a:ext cx="2455812" cy="2193783"/>
+          </a:xfrm>
+          <a:prstGeom prst="rect">
+            <a:avLst/>
+          </a:prstGeom>
+        </p:spPr>
+      </p:pic>
       <p:cxnSp>
         <p:nvCxnSpPr>
-          <p:cNvPr id="26" name="Straight Connector 25"/>
+          <p:cNvPr id="13" name="Straight Connector 12"/>
+          <p:cNvCxnSpPr>
+            <a:endCxn id="19" idx="3"/>
+          </p:cNvCxnSpPr>
+          <p:nvPr/>
+        </p:nvCxnSpPr>
+        <p:spPr>
+          <a:xfrm flipH="1" flipV="1">
+            <a:off x="5947952" y="3216558"/>
+            <a:ext cx="2" cy="818607"/>
+          </a:xfrm>
+          <a:prstGeom prst="line">
+            <a:avLst/>
+          </a:prstGeom>
+          <a:ln w="34925">
+            <a:solidFill>
+              <a:schemeClr val="tx1"/>
+            </a:solidFill>
+          </a:ln>
+        </p:spPr>
+        <p:style>
+          <a:lnRef idx="1">
+            <a:schemeClr val="accent1"/>
+          </a:lnRef>
+          <a:fillRef idx="0">
+            <a:schemeClr val="accent1"/>
+          </a:fillRef>
+          <a:effectRef idx="0">
+            <a:schemeClr val="accent1"/>
+          </a:effectRef>
+          <a:fontRef idx="minor">
+            <a:schemeClr val="tx1"/>
+          </a:fontRef>
+        </p:style>
+      </p:cxnSp>
+      <p:pic>
+        <p:nvPicPr>
+          <p:cNvPr id="12" name="Picture 11"/>
+          <p:cNvPicPr>
+            <a:picLocks noChangeAspect="1"/>
+          </p:cNvPicPr>
+          <p:nvPr/>
+        </p:nvPicPr>
+        <p:blipFill>
+          <a:blip r:embed="rId4"/>
+          <a:stretch>
+            <a:fillRect/>
+          </a:stretch>
+        </p:blipFill>
+        <p:spPr>
+          <a:xfrm>
+            <a:off x="8326875" y="4035164"/>
+            <a:ext cx="2455812" cy="2141531"/>
+          </a:xfrm>
+          <a:prstGeom prst="rect">
+            <a:avLst/>
+          </a:prstGeom>
+        </p:spPr>
+      </p:pic>
+      <p:pic>
+        <p:nvPicPr>
+          <p:cNvPr id="22" name="Picture 21"/>
+          <p:cNvPicPr>
+            <a:picLocks noChangeAspect="1"/>
+          </p:cNvPicPr>
+          <p:nvPr/>
+        </p:nvPicPr>
+        <p:blipFill>
+          <a:blip r:embed="rId5"/>
+          <a:stretch>
+            <a:fillRect/>
+          </a:stretch>
+        </p:blipFill>
+        <p:spPr>
+          <a:xfrm>
+            <a:off x="4720046" y="0"/>
+            <a:ext cx="2455812" cy="2972719"/>
+          </a:xfrm>
+          <a:prstGeom prst="rect">
+            <a:avLst/>
+          </a:prstGeom>
+        </p:spPr>
+      </p:pic>
+      <p:cxnSp>
+        <p:nvCxnSpPr>
+          <p:cNvPr id="14" name="Straight Connector 13"/>
           <p:cNvCxnSpPr/>
           <p:nvPr/>
         </p:nvCxnSpPr>
         <p:spPr>
-          <a:xfrm>
-            <a:off x="5146765" y="378822"/>
-            <a:ext cx="1698172" cy="0"/>
+          <a:xfrm flipV="1">
+            <a:off x="9489281" y="3390731"/>
+            <a:ext cx="0" cy="677903"/>
           </a:xfrm>
           <a:prstGeom prst="line">
             <a:avLst/>
           </a:prstGeom>
+          <a:ln w="34925">
+            <a:solidFill>
+              <a:schemeClr val="tx1"/>
+            </a:solidFill>
+          </a:ln>
         </p:spPr>
         <p:style>
           <a:lnRef idx="1">
-            <a:schemeClr val="dk1"/>
+            <a:schemeClr val="accent1"/>
           </a:lnRef>
           <a:fillRef idx="0">
-            <a:schemeClr val="dk1"/>
+            <a:schemeClr val="accent1"/>
           </a:fillRef>
           <a:effectRef idx="0">
-            <a:schemeClr val="dk1"/>
+            <a:schemeClr val="accent1"/>
           </a:effectRef>
           <a:fontRef idx="minor">
             <a:schemeClr val="tx1"/>

</xml_diff>